<commit_message>
Update resources presentation to include pydata open data science stack.
</commit_message>
<xml_diff>
--- a/8-Resources/8-Resources.pptx
+++ b/8-Resources/8-Resources.pptx
@@ -486,7 +486,7 @@
             <a:fld id="{B1986778-4955-48BF-B9A5-723767A6F1B2}" type="datetimeFigureOut">
               <a:rPr lang="en-US" smtClean="0"/>
               <a:pPr/>
-              <a:t>1/31/2017</a:t>
+              <a:t>2/2/2017</a:t>
             </a:fld>
             <a:endParaRPr lang="en-GB" dirty="0"/>
           </a:p>
@@ -5658,8 +5658,13 @@
             </a:pPr>
             <a:r>
               <a:rPr lang="en-GB" sz="2000" dirty="0"/>
-              <a:t>2. Python Scientific Stack</a:t>
-            </a:r>
+              <a:t>2. Python </a:t>
+            </a:r>
+            <a:r>
+              <a:rPr lang="en-GB" sz="2000" dirty="0" smtClean="0"/>
+              <a:t>Open Data Science Stack</a:t>
+            </a:r>
+            <a:endParaRPr lang="en-GB" sz="2000" dirty="0"/>
           </a:p>
           <a:p>
             <a:pPr marL="0" indent="0">
@@ -5669,10 +5674,16 @@
               <a:rPr lang="en-GB" sz="2000" dirty="0">
                 <a:hlinkClick r:id="rId3"/>
               </a:rPr>
-              <a:t>https://www.scipy.org/index.html</a:t>
-            </a:r>
-            <a:r>
-              <a:rPr lang="en-GB" sz="2000" dirty="0"/>
+              <a:t>http://</a:t>
+            </a:r>
+            <a:r>
+              <a:rPr lang="en-GB" sz="2000" dirty="0" smtClean="0">
+                <a:hlinkClick r:id="rId3"/>
+              </a:rPr>
+              <a:t>pydata.org/downloads.html</a:t>
+            </a:r>
+            <a:r>
+              <a:rPr lang="en-GB" sz="2000" dirty="0" smtClean="0"/>
               <a:t> </a:t>
             </a:r>
           </a:p>
@@ -8372,6 +8383,14 @@
                 </a:solidFill>
               </a:rPr>
             </a:br>
+            <a:r>
+              <a:rPr lang="en-US" dirty="0">
+                <a:solidFill>
+                  <a:schemeClr val="tx1"/>
+                </a:solidFill>
+              </a:rPr>
+              <a:t/>
+            </a:r>
             <a:br>
               <a:rPr lang="en-US" dirty="0">
                 <a:solidFill>

</xml_diff>

<commit_message>
Add media literacy IMVAIN checklist.
</commit_message>
<xml_diff>
--- a/8-Resources/8-Resources.pptx
+++ b/8-Resources/8-Resources.pptx
@@ -5,10 +5,10 @@
     <p:sldMasterId id="2147483649" r:id="rId1"/>
   </p:sldMasterIdLst>
   <p:notesMasterIdLst>
-    <p:notesMasterId r:id="rId26"/>
+    <p:notesMasterId r:id="rId27"/>
   </p:notesMasterIdLst>
   <p:handoutMasterIdLst>
-    <p:handoutMasterId r:id="rId27"/>
+    <p:handoutMasterId r:id="rId28"/>
   </p:handoutMasterIdLst>
   <p:sldIdLst>
     <p:sldId id="256" r:id="rId2"/>
@@ -32,9 +32,10 @@
     <p:sldId id="273" r:id="rId20"/>
     <p:sldId id="267" r:id="rId21"/>
     <p:sldId id="268" r:id="rId22"/>
-    <p:sldId id="269" r:id="rId23"/>
-    <p:sldId id="272" r:id="rId24"/>
-    <p:sldId id="283" r:id="rId25"/>
+    <p:sldId id="284" r:id="rId23"/>
+    <p:sldId id="269" r:id="rId24"/>
+    <p:sldId id="272" r:id="rId25"/>
+    <p:sldId id="283" r:id="rId26"/>
   </p:sldIdLst>
   <p:sldSz cx="9144000" cy="6858000" type="screen4x3"/>
   <p:notesSz cx="7099300" cy="10234613"/>
@@ -6838,8 +6839,13 @@
           <a:p>
             <a:r>
               <a:rPr lang="en-US" dirty="0"/>
-              <a:t>Where do the data come from?  What are the potential biases/limitations of that source? </a:t>
-            </a:r>
+              <a:t>Where do the data come from?  What are the potential biases/limitations of </a:t>
+            </a:r>
+            <a:r>
+              <a:rPr lang="en-US" dirty="0" smtClean="0"/>
+              <a:t>these data? </a:t>
+            </a:r>
+            <a:endParaRPr lang="en-US" dirty="0"/>
           </a:p>
           <a:p>
             <a:r>
@@ -7988,6 +7994,230 @@
             <p:ph type="title"/>
           </p:nvPr>
         </p:nvSpPr>
+        <p:spPr>
+          <a:xfrm>
+            <a:off x="330200" y="751297"/>
+            <a:ext cx="8489950" cy="540730"/>
+          </a:xfrm>
+        </p:spPr>
+        <p:txBody>
+          <a:bodyPr/>
+          <a:lstStyle/>
+          <a:p>
+            <a:pPr marL="0" indent="0">
+              <a:buNone/>
+            </a:pPr>
+            <a:r>
+              <a:rPr lang="en-US" dirty="0"/>
+              <a:t>IMVAIN Source Reliability Checklist</a:t>
+            </a:r>
+          </a:p>
+        </p:txBody>
+      </p:sp>
+      <p:sp>
+        <p:nvSpPr>
+          <p:cNvPr id="3" name="Content Placeholder 2"/>
+          <p:cNvSpPr>
+            <a:spLocks noGrp="1"/>
+          </p:cNvSpPr>
+          <p:nvPr>
+            <p:ph idx="1"/>
+          </p:nvPr>
+        </p:nvSpPr>
+        <p:spPr>
+          <a:xfrm>
+            <a:off x="330200" y="1583794"/>
+            <a:ext cx="8489950" cy="4994698"/>
+          </a:xfrm>
+        </p:spPr>
+        <p:txBody>
+          <a:bodyPr/>
+          <a:lstStyle/>
+          <a:p>
+            <a:r>
+              <a:rPr lang="en-US" sz="2400" b="1" dirty="0" smtClean="0"/>
+              <a:t>Independent</a:t>
+            </a:r>
+            <a:r>
+              <a:rPr lang="en-US" sz="2400" dirty="0" smtClean="0"/>
+              <a:t> </a:t>
+            </a:r>
+            <a:r>
+              <a:rPr lang="en-US" sz="2400" dirty="0"/>
+              <a:t>sources are preferable to self-interested sources.</a:t>
+            </a:r>
+          </a:p>
+          <a:p>
+            <a:r>
+              <a:rPr lang="en-US" sz="2400" b="1" dirty="0"/>
+              <a:t>Multiple</a:t>
+            </a:r>
+            <a:r>
+              <a:rPr lang="en-US" sz="2400" dirty="0"/>
+              <a:t> sources are preferable to a report based on a single source.</a:t>
+            </a:r>
+          </a:p>
+          <a:p>
+            <a:r>
+              <a:rPr lang="en-US" sz="2400" dirty="0"/>
+              <a:t>Sources who </a:t>
+            </a:r>
+            <a:r>
+              <a:rPr lang="en-US" sz="2400" b="1" dirty="0"/>
+              <a:t>Verify</a:t>
+            </a:r>
+            <a:r>
+              <a:rPr lang="en-US" sz="2400" dirty="0"/>
+              <a:t> or provide verifiable information are preferable to those who merely assert.</a:t>
+            </a:r>
+          </a:p>
+          <a:p>
+            <a:r>
+              <a:rPr lang="en-US" sz="2400" b="1" dirty="0"/>
+              <a:t>Authoritative</a:t>
+            </a:r>
+            <a:r>
+              <a:rPr lang="en-US" sz="2400" dirty="0"/>
+              <a:t> and/or </a:t>
+            </a:r>
+            <a:r>
+              <a:rPr lang="en-US" sz="2400" b="1" dirty="0"/>
+              <a:t>Informed</a:t>
+            </a:r>
+            <a:r>
+              <a:rPr lang="en-US" sz="2400" dirty="0"/>
+              <a:t> sources are preferable to sources who are uninformed or lack authoritative background.</a:t>
+            </a:r>
+          </a:p>
+          <a:p>
+            <a:r>
+              <a:rPr lang="en-US" sz="2400" b="1" dirty="0"/>
+              <a:t>Named</a:t>
+            </a:r>
+            <a:r>
+              <a:rPr lang="en-US" sz="2400" dirty="0"/>
+              <a:t> sources are better than anonymous ones</a:t>
+            </a:r>
+            <a:r>
+              <a:rPr lang="en-US" sz="2400" dirty="0" smtClean="0"/>
+              <a:t>.</a:t>
+            </a:r>
+            <a:endParaRPr lang="en-US" sz="2400" dirty="0"/>
+          </a:p>
+        </p:txBody>
+      </p:sp>
+      <p:sp>
+        <p:nvSpPr>
+          <p:cNvPr id="4" name="Slide Number Placeholder 3"/>
+          <p:cNvSpPr>
+            <a:spLocks noGrp="1"/>
+          </p:cNvSpPr>
+          <p:nvPr>
+            <p:ph type="sldNum" sz="quarter" idx="10"/>
+          </p:nvPr>
+        </p:nvSpPr>
+        <p:spPr/>
+        <p:txBody>
+          <a:bodyPr/>
+          <a:lstStyle/>
+          <a:p>
+            <a:pPr algn="ctr"/>
+            <a:fld id="{DB5A3A47-29A7-45E5-923E-10FF85749154}" type="slidenum">
+              <a:rPr lang="en-GB" smtClean="0"/>
+              <a:pPr algn="ctr"/>
+              <a:t>22</a:t>
+            </a:fld>
+            <a:endParaRPr lang="en-GB" dirty="0"/>
+          </a:p>
+        </p:txBody>
+      </p:sp>
+      <p:sp>
+        <p:nvSpPr>
+          <p:cNvPr id="5" name="TextBox 4"/>
+          <p:cNvSpPr txBox="1"/>
+          <p:nvPr/>
+        </p:nvSpPr>
+        <p:spPr>
+          <a:xfrm>
+            <a:off x="330200" y="5800392"/>
+            <a:ext cx="8489950" cy="738664"/>
+          </a:xfrm>
+          <a:prstGeom prst="rect">
+            <a:avLst/>
+          </a:prstGeom>
+          <a:noFill/>
+        </p:spPr>
+        <p:txBody>
+          <a:bodyPr wrap="square" rtlCol="0">
+            <a:spAutoFit/>
+          </a:bodyPr>
+          <a:lstStyle/>
+          <a:p>
+            <a:r>
+              <a:rPr lang="en-US" sz="1400" dirty="0"/>
+              <a:t>R. O’Connor, “Practical Tools for Teaching News Literacy,” </a:t>
+            </a:r>
+            <a:r>
+              <a:rPr lang="en-US" sz="1400" i="1" dirty="0"/>
+              <a:t>The Learning Network - Teaching and Learning with the New York Times</a:t>
+            </a:r>
+            <a:r>
+              <a:rPr lang="en-US" sz="1400" dirty="0"/>
+              <a:t>, 08-Oct-2014. </a:t>
+            </a:r>
+            <a:r>
+              <a:rPr lang="en-US" sz="1400" u="sng" dirty="0">
+                <a:hlinkClick r:id="rId2"/>
+              </a:rPr>
+              <a:t>https://learning.blogs.nytimes.com/2014/10/08/guest-post-practical-tools-for-teaching-news-literacy/</a:t>
+            </a:r>
+            <a:r>
+              <a:rPr lang="en-US" sz="1400" dirty="0"/>
+              <a:t> </a:t>
+            </a:r>
+          </a:p>
+        </p:txBody>
+      </p:sp>
+    </p:spTree>
+    <p:extLst>
+      <p:ext uri="{BB962C8B-B14F-4D97-AF65-F5344CB8AC3E}">
+        <p14:creationId xmlns:p14="http://schemas.microsoft.com/office/powerpoint/2010/main" val="1302584380"/>
+      </p:ext>
+    </p:extLst>
+  </p:cSld>
+  <p:clrMapOvr>
+    <a:masterClrMapping/>
+  </p:clrMapOvr>
+</p:sld>
+</file>
+
+<file path=ppt/slides/slide23.xml><?xml version="1.0" encoding="utf-8"?>
+<p:sld xmlns:a="http://schemas.openxmlformats.org/drawingml/2006/main" xmlns:r="http://schemas.openxmlformats.org/officeDocument/2006/relationships" xmlns:p="http://schemas.openxmlformats.org/presentationml/2006/main">
+  <p:cSld>
+    <p:spTree>
+      <p:nvGrpSpPr>
+        <p:cNvPr id="1" name=""/>
+        <p:cNvGrpSpPr/>
+        <p:nvPr/>
+      </p:nvGrpSpPr>
+      <p:grpSpPr>
+        <a:xfrm>
+          <a:off x="0" y="0"/>
+          <a:ext cx="0" cy="0"/>
+          <a:chOff x="0" y="0"/>
+          <a:chExt cx="0" cy="0"/>
+        </a:xfrm>
+      </p:grpSpPr>
+      <p:sp>
+        <p:nvSpPr>
+          <p:cNvPr id="2" name="Title 1"/>
+          <p:cNvSpPr>
+            <a:spLocks noGrp="1"/>
+          </p:cNvSpPr>
+          <p:nvPr>
+            <p:ph type="title"/>
+          </p:nvPr>
+        </p:nvSpPr>
         <p:spPr/>
         <p:txBody>
           <a:bodyPr/>
@@ -8048,7 +8278,7 @@
             <a:fld id="{DB5A3A47-29A7-45E5-923E-10FF85749154}" type="slidenum">
               <a:rPr lang="en-GB" smtClean="0"/>
               <a:pPr algn="ctr"/>
-              <a:t>22</a:t>
+              <a:t>23</a:t>
             </a:fld>
             <a:endParaRPr lang="en-GB" dirty="0"/>
           </a:p>
@@ -8223,7 +8453,7 @@
 </p:sld>
 </file>
 
-<file path=ppt/slides/slide23.xml><?xml version="1.0" encoding="utf-8"?>
+<file path=ppt/slides/slide24.xml><?xml version="1.0" encoding="utf-8"?>
 <p:sld xmlns:a="http://schemas.openxmlformats.org/drawingml/2006/main" xmlns:r="http://schemas.openxmlformats.org/officeDocument/2006/relationships" xmlns:p="http://schemas.openxmlformats.org/presentationml/2006/main">
   <p:cSld>
     <p:spTree>
@@ -8311,7 +8541,7 @@
             <a:fld id="{DB5A3A47-29A7-45E5-923E-10FF85749154}" type="slidenum">
               <a:rPr lang="en-GB" smtClean="0"/>
               <a:pPr algn="ctr"/>
-              <a:t>23</a:t>
+              <a:t>24</a:t>
             </a:fld>
             <a:endParaRPr lang="en-GB" dirty="0"/>
           </a:p>
@@ -8330,7 +8560,7 @@
 </p:sld>
 </file>
 
-<file path=ppt/slides/slide24.xml><?xml version="1.0" encoding="utf-8"?>
+<file path=ppt/slides/slide25.xml><?xml version="1.0" encoding="utf-8"?>
 <p:sld xmlns:a="http://schemas.openxmlformats.org/drawingml/2006/main" xmlns:r="http://schemas.openxmlformats.org/officeDocument/2006/relationships" xmlns:p="http://schemas.openxmlformats.org/presentationml/2006/main">
   <p:cSld>
     <p:spTree>

</xml_diff>

<commit_message>
Added calling BS to resources lecture.
</commit_message>
<xml_diff>
--- a/8-Resources/8-Resources.pptx
+++ b/8-Resources/8-Resources.pptx
@@ -34,7 +34,7 @@
     <p:sldId id="268" r:id="rId22"/>
     <p:sldId id="284" r:id="rId23"/>
     <p:sldId id="269" r:id="rId24"/>
-    <p:sldId id="272" r:id="rId25"/>
+    <p:sldId id="285" r:id="rId25"/>
     <p:sldId id="283" r:id="rId26"/>
   </p:sldIdLst>
   <p:sldSz cx="9144000" cy="6858000" type="screen4x3"/>
@@ -487,7 +487,7 @@
             <a:fld id="{B1986778-4955-48BF-B9A5-723767A6F1B2}" type="datetimeFigureOut">
               <a:rPr lang="en-US" smtClean="0"/>
               <a:pPr/>
-              <a:t>2/2/2017</a:t>
+              <a:t>2/3/2017</a:t>
             </a:fld>
             <a:endParaRPr lang="en-GB" dirty="0"/>
           </a:p>
@@ -4364,6 +4364,13 @@
   <p:clrMapOvr>
     <a:masterClrMapping/>
   </p:clrMapOvr>
+  <p:timing>
+    <p:tnLst>
+      <p:par>
+        <p:cTn id="1" dur="indefinite" restart="never" nodeType="tmRoot"/>
+      </p:par>
+    </p:tnLst>
+  </p:timing>
 </p:sld>
 </file>
 
@@ -8188,6 +8195,13 @@
   <p:clrMapOvr>
     <a:masterClrMapping/>
   </p:clrMapOvr>
+  <p:timing>
+    <p:tnLst>
+      <p:par>
+        <p:cTn id="1" dur="indefinite" restart="never" nodeType="tmRoot"/>
+      </p:par>
+    </p:tnLst>
+  </p:timing>
 </p:sld>
 </file>
 
@@ -8487,41 +8501,37 @@
           <a:p>
             <a:r>
               <a:rPr lang="en-US" dirty="0"/>
-              <a:t>Sorting through the noise…</a:t>
-            </a:r>
-          </a:p>
-        </p:txBody>
-      </p:sp>
-      <p:sp>
-        <p:nvSpPr>
-          <p:cNvPr id="3" name="Content Placeholder 2"/>
-          <p:cNvSpPr>
-            <a:spLocks noGrp="1"/>
-          </p:cNvSpPr>
+              <a:t>INFO 198, University of Washington</a:t>
+            </a:r>
+          </a:p>
+        </p:txBody>
+      </p:sp>
+      <p:pic>
+        <p:nvPicPr>
+          <p:cNvPr id="5" name="Content Placeholder 4"/>
+          <p:cNvPicPr>
+            <a:picLocks noGrp="1" noChangeAspect="1"/>
+          </p:cNvPicPr>
           <p:nvPr>
             <p:ph idx="1"/>
           </p:nvPr>
-        </p:nvSpPr>
+        </p:nvPicPr>
+        <p:blipFill>
+          <a:blip r:embed="rId2"/>
+          <a:stretch>
+            <a:fillRect/>
+          </a:stretch>
+        </p:blipFill>
         <p:spPr>
           <a:xfrm>
-            <a:off x="330200" y="2708920"/>
-            <a:ext cx="8489950" cy="3628380"/>
+            <a:off x="1432278" y="1359104"/>
+            <a:ext cx="6285793" cy="5129713"/>
           </a:xfrm>
+          <a:prstGeom prst="rect">
+            <a:avLst/>
+          </a:prstGeom>
         </p:spPr>
-        <p:txBody>
-          <a:bodyPr/>
-          <a:lstStyle/>
-          <a:p>
-            <a:pPr marL="0" indent="0">
-              <a:buNone/>
-            </a:pPr>
-            <a:r>
-              <a:rPr lang="en-US" dirty="0"/>
-              <a:t>This is important!  We will come back to it with more strategies later in the course.  </a:t>
-            </a:r>
-          </a:p>
-        </p:txBody>
-      </p:sp>
+      </p:pic>
       <p:sp>
         <p:nvSpPr>
           <p:cNvPr id="4" name="Slide Number Placeholder 3"/>
@@ -8547,16 +8557,162 @@
           </a:p>
         </p:txBody>
       </p:sp>
+      <p:sp>
+        <p:nvSpPr>
+          <p:cNvPr id="6" name="Rectangle 5"/>
+          <p:cNvSpPr/>
+          <p:nvPr/>
+        </p:nvSpPr>
+        <p:spPr>
+          <a:xfrm>
+            <a:off x="6552220" y="6209159"/>
+            <a:ext cx="2782574" cy="369332"/>
+          </a:xfrm>
+          <a:prstGeom prst="rect">
+            <a:avLst/>
+          </a:prstGeom>
+        </p:spPr>
+        <p:txBody>
+          <a:bodyPr wrap="square">
+            <a:spAutoFit/>
+          </a:bodyPr>
+          <a:lstStyle/>
+          <a:p>
+            <a:r>
+              <a:rPr lang="en-US" dirty="0">
+                <a:hlinkClick r:id="rId3"/>
+              </a:rPr>
+              <a:t>http://</a:t>
+            </a:r>
+            <a:r>
+              <a:rPr lang="en-US" dirty="0" smtClean="0">
+                <a:hlinkClick r:id="rId3"/>
+              </a:rPr>
+              <a:t>callingbullshit.org</a:t>
+            </a:r>
+            <a:r>
+              <a:rPr lang="en-US" dirty="0" smtClean="0"/>
+              <a:t> </a:t>
+            </a:r>
+            <a:endParaRPr lang="en-US" dirty="0"/>
+          </a:p>
+        </p:txBody>
+      </p:sp>
     </p:spTree>
     <p:extLst>
       <p:ext uri="{BB962C8B-B14F-4D97-AF65-F5344CB8AC3E}">
-        <p14:creationId xmlns:p14="http://schemas.microsoft.com/office/powerpoint/2010/main" val="3345812395"/>
+        <p14:creationId xmlns:p14="http://schemas.microsoft.com/office/powerpoint/2010/main" val="2708784801"/>
       </p:ext>
     </p:extLst>
   </p:cSld>
   <p:clrMapOvr>
     <a:masterClrMapping/>
   </p:clrMapOvr>
+  <p:timing>
+    <p:tnLst>
+      <p:par>
+        <p:cTn id="1" dur="indefinite" restart="never" nodeType="tmRoot">
+          <p:childTnLst>
+            <p:seq concurrent="1" nextAc="seek">
+              <p:cTn id="2" dur="indefinite" nodeType="mainSeq">
+                <p:childTnLst>
+                  <p:par>
+                    <p:cTn id="3" fill="hold">
+                      <p:stCondLst>
+                        <p:cond delay="indefinite"/>
+                      </p:stCondLst>
+                      <p:childTnLst>
+                        <p:par>
+                          <p:cTn id="4" fill="hold">
+                            <p:stCondLst>
+                              <p:cond delay="0"/>
+                            </p:stCondLst>
+                            <p:childTnLst>
+                              <p:par>
+                                <p:cTn id="5" presetID="1" presetClass="entr" presetSubtype="0" fill="hold" nodeType="clickEffect">
+                                  <p:stCondLst>
+                                    <p:cond delay="0"/>
+                                  </p:stCondLst>
+                                  <p:childTnLst>
+                                    <p:set>
+                                      <p:cBhvr>
+                                        <p:cTn id="6" dur="1" fill="hold">
+                                          <p:stCondLst>
+                                            <p:cond delay="0"/>
+                                          </p:stCondLst>
+                                        </p:cTn>
+                                        <p:tgtEl>
+                                          <p:spTgt spid="5"/>
+                                        </p:tgtEl>
+                                        <p:attrNameLst>
+                                          <p:attrName>style.visibility</p:attrName>
+                                        </p:attrNameLst>
+                                      </p:cBhvr>
+                                      <p:to>
+                                        <p:strVal val="visible"/>
+                                      </p:to>
+                                    </p:set>
+                                  </p:childTnLst>
+                                </p:cTn>
+                              </p:par>
+                              <p:par>
+                                <p:cTn id="7" presetID="1" presetClass="entr" presetSubtype="0" fill="hold" grpId="0" nodeType="withEffect">
+                                  <p:stCondLst>
+                                    <p:cond delay="0"/>
+                                  </p:stCondLst>
+                                  <p:childTnLst>
+                                    <p:set>
+                                      <p:cBhvr>
+                                        <p:cTn id="8" dur="1" fill="hold">
+                                          <p:stCondLst>
+                                            <p:cond delay="0"/>
+                                          </p:stCondLst>
+                                        </p:cTn>
+                                        <p:tgtEl>
+                                          <p:spTgt spid="6"/>
+                                        </p:tgtEl>
+                                        <p:attrNameLst>
+                                          <p:attrName>style.visibility</p:attrName>
+                                        </p:attrNameLst>
+                                      </p:cBhvr>
+                                      <p:to>
+                                        <p:strVal val="visible"/>
+                                      </p:to>
+                                    </p:set>
+                                  </p:childTnLst>
+                                </p:cTn>
+                              </p:par>
+                            </p:childTnLst>
+                          </p:cTn>
+                        </p:par>
+                      </p:childTnLst>
+                    </p:cTn>
+                  </p:par>
+                </p:childTnLst>
+              </p:cTn>
+              <p:prevCondLst>
+                <p:cond evt="onPrev" delay="0">
+                  <p:tgtEl>
+                    <p:sldTgt/>
+                  </p:tgtEl>
+                </p:cond>
+              </p:prevCondLst>
+              <p:nextCondLst>
+                <p:cond evt="onNext" delay="0">
+                  <p:tgtEl>
+                    <p:sldTgt/>
+                  </p:tgtEl>
+                </p:cond>
+              </p:nextCondLst>
+            </p:seq>
+          </p:childTnLst>
+        </p:cTn>
+      </p:par>
+    </p:tnLst>
+    <p:bldLst>
+      <p:bldP spid="6" grpId="0"/>
+    </p:bldLst>
+  </p:timing>
 </p:sld>
 </file>
 
@@ -8671,6 +8827,13 @@
   <p:clrMapOvr>
     <a:masterClrMapping/>
   </p:clrMapOvr>
+  <p:timing>
+    <p:tnLst>
+      <p:par>
+        <p:cTn id="1" dur="indefinite" restart="never" nodeType="tmRoot"/>
+      </p:par>
+    </p:tnLst>
+  </p:timing>
 </p:sld>
 </file>
 

</xml_diff>